<commit_message>
ADDED:EFK/Rancher project related files;
</commit_message>
<xml_diff>
--- a/Documents/XLPTeachableMachine.pptx
+++ b/Documents/XLPTeachableMachine.pptx
@@ -289,7 +289,7 @@
           <a:p>
             <a:fld id="{413EE626-7EB1-464B-8811-9FDDDDBDB5E5}" type="datetimeFigureOut">
               <a:rPr kumimoji="1" lang="zh-CN" altLang="en-US" smtClean="0"/>
-              <a:t>13/10/17</a:t>
+              <a:t>09/11/17</a:t>
             </a:fld>
             <a:endParaRPr kumimoji="1" lang="zh-CN" altLang="en-US"/>
           </a:p>
@@ -459,7 +459,7 @@
           <a:p>
             <a:fld id="{413EE626-7EB1-464B-8811-9FDDDDBDB5E5}" type="datetimeFigureOut">
               <a:rPr kumimoji="1" lang="zh-CN" altLang="en-US" smtClean="0"/>
-              <a:t>13/10/17</a:t>
+              <a:t>09/11/17</a:t>
             </a:fld>
             <a:endParaRPr kumimoji="1" lang="zh-CN" altLang="en-US"/>
           </a:p>
@@ -639,7 +639,7 @@
           <a:p>
             <a:fld id="{413EE626-7EB1-464B-8811-9FDDDDBDB5E5}" type="datetimeFigureOut">
               <a:rPr kumimoji="1" lang="zh-CN" altLang="en-US" smtClean="0"/>
-              <a:t>13/10/17</a:t>
+              <a:t>09/11/17</a:t>
             </a:fld>
             <a:endParaRPr kumimoji="1" lang="zh-CN" altLang="en-US"/>
           </a:p>
@@ -809,7 +809,7 @@
           <a:p>
             <a:fld id="{413EE626-7EB1-464B-8811-9FDDDDBDB5E5}" type="datetimeFigureOut">
               <a:rPr kumimoji="1" lang="zh-CN" altLang="en-US" smtClean="0"/>
-              <a:t>13/10/17</a:t>
+              <a:t>09/11/17</a:t>
             </a:fld>
             <a:endParaRPr kumimoji="1" lang="zh-CN" altLang="en-US"/>
           </a:p>
@@ -1055,7 +1055,7 @@
           <a:p>
             <a:fld id="{413EE626-7EB1-464B-8811-9FDDDDBDB5E5}" type="datetimeFigureOut">
               <a:rPr kumimoji="1" lang="zh-CN" altLang="en-US" smtClean="0"/>
-              <a:t>13/10/17</a:t>
+              <a:t>09/11/17</a:t>
             </a:fld>
             <a:endParaRPr kumimoji="1" lang="zh-CN" altLang="en-US"/>
           </a:p>
@@ -1343,7 +1343,7 @@
           <a:p>
             <a:fld id="{413EE626-7EB1-464B-8811-9FDDDDBDB5E5}" type="datetimeFigureOut">
               <a:rPr kumimoji="1" lang="zh-CN" altLang="en-US" smtClean="0"/>
-              <a:t>13/10/17</a:t>
+              <a:t>09/11/17</a:t>
             </a:fld>
             <a:endParaRPr kumimoji="1" lang="zh-CN" altLang="en-US"/>
           </a:p>
@@ -1765,7 +1765,7 @@
           <a:p>
             <a:fld id="{413EE626-7EB1-464B-8811-9FDDDDBDB5E5}" type="datetimeFigureOut">
               <a:rPr kumimoji="1" lang="zh-CN" altLang="en-US" smtClean="0"/>
-              <a:t>13/10/17</a:t>
+              <a:t>09/11/17</a:t>
             </a:fld>
             <a:endParaRPr kumimoji="1" lang="zh-CN" altLang="en-US"/>
           </a:p>
@@ -1883,7 +1883,7 @@
           <a:p>
             <a:fld id="{413EE626-7EB1-464B-8811-9FDDDDBDB5E5}" type="datetimeFigureOut">
               <a:rPr kumimoji="1" lang="zh-CN" altLang="en-US" smtClean="0"/>
-              <a:t>13/10/17</a:t>
+              <a:t>09/11/17</a:t>
             </a:fld>
             <a:endParaRPr kumimoji="1" lang="zh-CN" altLang="en-US"/>
           </a:p>
@@ -1978,7 +1978,7 @@
           <a:p>
             <a:fld id="{413EE626-7EB1-464B-8811-9FDDDDBDB5E5}" type="datetimeFigureOut">
               <a:rPr kumimoji="1" lang="zh-CN" altLang="en-US" smtClean="0"/>
-              <a:t>13/10/17</a:t>
+              <a:t>09/11/17</a:t>
             </a:fld>
             <a:endParaRPr kumimoji="1" lang="zh-CN" altLang="en-US"/>
           </a:p>
@@ -2255,7 +2255,7 @@
           <a:p>
             <a:fld id="{413EE626-7EB1-464B-8811-9FDDDDBDB5E5}" type="datetimeFigureOut">
               <a:rPr kumimoji="1" lang="zh-CN" altLang="en-US" smtClean="0"/>
-              <a:t>13/10/17</a:t>
+              <a:t>09/11/17</a:t>
             </a:fld>
             <a:endParaRPr kumimoji="1" lang="zh-CN" altLang="en-US"/>
           </a:p>
@@ -2508,7 +2508,7 @@
           <a:p>
             <a:fld id="{413EE626-7EB1-464B-8811-9FDDDDBDB5E5}" type="datetimeFigureOut">
               <a:rPr kumimoji="1" lang="zh-CN" altLang="en-US" smtClean="0"/>
-              <a:t>13/10/17</a:t>
+              <a:t>09/11/17</a:t>
             </a:fld>
             <a:endParaRPr kumimoji="1" lang="zh-CN" altLang="en-US"/>
           </a:p>
@@ -2721,7 +2721,7 @@
           <a:p>
             <a:fld id="{413EE626-7EB1-464B-8811-9FDDDDBDB5E5}" type="datetimeFigureOut">
               <a:rPr kumimoji="1" lang="zh-CN" altLang="en-US" smtClean="0"/>
-              <a:t>13/10/17</a:t>
+              <a:t>09/11/17</a:t>
             </a:fld>
             <a:endParaRPr kumimoji="1" lang="zh-CN" altLang="en-US"/>
           </a:p>
@@ -3214,7 +3214,7 @@
         </p:nvSpPr>
         <p:spPr>
           <a:xfrm>
-            <a:off x="12451" y="2488306"/>
+            <a:off x="12451" y="1778542"/>
             <a:ext cx="2230553" cy="2856369"/>
           </a:xfrm>
           <a:prstGeom prst="rect">
@@ -3252,7 +3252,7 @@
         </p:nvSpPr>
         <p:spPr>
           <a:xfrm>
-            <a:off x="2873032" y="2501012"/>
+            <a:off x="2873032" y="1791248"/>
             <a:ext cx="2720632" cy="2856369"/>
           </a:xfrm>
           <a:prstGeom prst="rect">
@@ -3290,7 +3290,7 @@
         </p:nvSpPr>
         <p:spPr>
           <a:xfrm>
-            <a:off x="6269476" y="2501012"/>
+            <a:off x="6269476" y="1791248"/>
             <a:ext cx="2874524" cy="2856369"/>
           </a:xfrm>
           <a:prstGeom prst="rect">
@@ -3342,7 +3342,7 @@
         </p:blipFill>
         <p:spPr>
           <a:xfrm>
-            <a:off x="300963" y="3226099"/>
+            <a:off x="300963" y="2516335"/>
             <a:ext cx="1625600" cy="1625600"/>
           </a:xfrm>
           <a:prstGeom prst="rect">
@@ -3361,7 +3361,7 @@
         </p:nvCxnSpPr>
         <p:spPr>
           <a:xfrm>
-            <a:off x="2243004" y="3916491"/>
+            <a:off x="2243004" y="3206727"/>
             <a:ext cx="630028" cy="12706"/>
           </a:xfrm>
           <a:prstGeom prst="line">
@@ -3396,7 +3396,7 @@
         </p:nvCxnSpPr>
         <p:spPr>
           <a:xfrm flipV="1">
-            <a:off x="2243004" y="3062965"/>
+            <a:off x="2243004" y="2353201"/>
             <a:ext cx="642478" cy="853526"/>
           </a:xfrm>
           <a:prstGeom prst="line">
@@ -3431,7 +3431,7 @@
         </p:nvCxnSpPr>
         <p:spPr>
           <a:xfrm>
-            <a:off x="2243004" y="3916491"/>
+            <a:off x="2243004" y="3206727"/>
             <a:ext cx="642479" cy="761920"/>
           </a:xfrm>
           <a:prstGeom prst="line">
@@ -3464,7 +3464,7 @@
         </p:nvSpPr>
         <p:spPr>
           <a:xfrm>
-            <a:off x="3249818" y="2118974"/>
+            <a:off x="3249818" y="1409210"/>
             <a:ext cx="2008102" cy="369332"/>
           </a:xfrm>
           <a:prstGeom prst="rect">
@@ -3494,7 +3494,7 @@
         </p:nvCxnSpPr>
         <p:spPr>
           <a:xfrm>
-            <a:off x="5560245" y="3916745"/>
+            <a:off x="5560245" y="3206981"/>
             <a:ext cx="675357" cy="0"/>
           </a:xfrm>
           <a:prstGeom prst="line">
@@ -3527,7 +3527,7 @@
         </p:nvCxnSpPr>
         <p:spPr>
           <a:xfrm flipV="1">
-            <a:off x="5560245" y="3063219"/>
+            <a:off x="5560245" y="2353455"/>
             <a:ext cx="642478" cy="853526"/>
           </a:xfrm>
           <a:prstGeom prst="line">
@@ -3560,7 +3560,7 @@
         </p:nvCxnSpPr>
         <p:spPr>
           <a:xfrm>
-            <a:off x="5560245" y="3916745"/>
+            <a:off x="5560245" y="3206981"/>
             <a:ext cx="642478" cy="935208"/>
           </a:xfrm>
           <a:prstGeom prst="line">
@@ -3594,14 +3594,14 @@
           <p:nvPr>
             <p:extLst>
               <p:ext uri="{D42A27DB-BD31-4B8C-83A1-F6EECF244321}">
-                <p14:modId xmlns:p14="http://schemas.microsoft.com/office/powerpoint/2010/main" val="1189360065"/>
+                <p14:modId xmlns:p14="http://schemas.microsoft.com/office/powerpoint/2010/main" val="5549170"/>
               </p:ext>
             </p:extLst>
           </p:nvPr>
         </p:nvGraphicFramePr>
         <p:xfrm>
-          <a:off x="2967264" y="3027411"/>
-          <a:ext cx="904090" cy="1651000"/>
+          <a:off x="2967264" y="2317647"/>
+          <a:ext cx="904090" cy="1381760"/>
         </p:xfrm>
         <a:graphic>
           <a:graphicData uri="http://schemas.openxmlformats.org/drawingml/2006/table">
@@ -3651,14 +3651,8 @@
                     <a:lstStyle/>
                     <a:p>
                       <a:r>
-                        <a:rPr lang="en-US" altLang="zh-CN" dirty="0" smtClean="0"/>
-                        <a:t>Media</a:t>
-                      </a:r>
-                    </a:p>
-                    <a:p>
-                      <a:r>
-                        <a:rPr lang="en-US" altLang="zh-CN" dirty="0" smtClean="0"/>
-                        <a:t>goblin</a:t>
+                        <a:rPr lang="en-US" altLang="zh-CN" dirty="0" err="1" smtClean="0"/>
+                        <a:t>Netlify</a:t>
                       </a:r>
                       <a:endParaRPr lang="zh-CN" altLang="en-US" dirty="0"/>
                     </a:p>
@@ -3678,7 +3672,7 @@
         </p:nvSpPr>
         <p:spPr>
           <a:xfrm flipH="1">
-            <a:off x="6693019" y="2117048"/>
+            <a:off x="6693019" y="1407284"/>
             <a:ext cx="1993781" cy="369332"/>
           </a:xfrm>
           <a:prstGeom prst="rect">
@@ -3708,7 +3702,7 @@
         </p:nvSpPr>
         <p:spPr>
           <a:xfrm flipH="1">
-            <a:off x="224882" y="2117048"/>
+            <a:off x="224882" y="1407284"/>
             <a:ext cx="1993781" cy="369332"/>
           </a:xfrm>
           <a:prstGeom prst="rect">
@@ -3739,13 +3733,13 @@
           <p:nvPr>
             <p:extLst>
               <p:ext uri="{D42A27DB-BD31-4B8C-83A1-F6EECF244321}">
-                <p14:modId xmlns:p14="http://schemas.microsoft.com/office/powerpoint/2010/main" val="1688178176"/>
+                <p14:modId xmlns:p14="http://schemas.microsoft.com/office/powerpoint/2010/main" val="2897419904"/>
               </p:ext>
             </p:extLst>
           </p:nvPr>
         </p:nvGraphicFramePr>
         <p:xfrm>
-          <a:off x="4353829" y="3269090"/>
+          <a:off x="4353829" y="2559326"/>
           <a:ext cx="904090" cy="1112520"/>
         </p:xfrm>
         <a:graphic>
@@ -3817,13 +3811,13 @@
           <p:nvPr>
             <p:extLst>
               <p:ext uri="{D42A27DB-BD31-4B8C-83A1-F6EECF244321}">
-                <p14:modId xmlns:p14="http://schemas.microsoft.com/office/powerpoint/2010/main" val="4179965556"/>
+                <p14:modId xmlns:p14="http://schemas.microsoft.com/office/powerpoint/2010/main" val="8407247"/>
               </p:ext>
             </p:extLst>
           </p:nvPr>
         </p:nvGraphicFramePr>
         <p:xfrm>
-          <a:off x="6693019" y="2816677"/>
+          <a:off x="6693019" y="2106913"/>
           <a:ext cx="1892300" cy="2225040"/>
         </p:xfrm>
         <a:graphic>
@@ -3944,14 +3938,14 @@
           <p:nvPr>
             <p:extLst>
               <p:ext uri="{D42A27DB-BD31-4B8C-83A1-F6EECF244321}">
-                <p14:modId xmlns:p14="http://schemas.microsoft.com/office/powerpoint/2010/main" val="4272813795"/>
+                <p14:modId xmlns:p14="http://schemas.microsoft.com/office/powerpoint/2010/main" val="2608386585"/>
               </p:ext>
             </p:extLst>
           </p:nvPr>
         </p:nvGraphicFramePr>
         <p:xfrm>
-          <a:off x="1378911" y="5588000"/>
-          <a:ext cx="6096000" cy="1371600"/>
+          <a:off x="1378911" y="4665746"/>
+          <a:ext cx="6096000" cy="2120654"/>
         </p:xfrm>
         <a:graphic>
           <a:graphicData uri="http://schemas.openxmlformats.org/drawingml/2006/table">
@@ -3964,7 +3958,7 @@
                 <a:gridCol w="2032000"/>
                 <a:gridCol w="2032000"/>
               </a:tblGrid>
-              <a:tr h="311604">
+              <a:tr h="347977">
                 <a:tc>
                   <a:txBody>
                     <a:bodyPr/>
@@ -3972,11 +3966,7 @@
                     <a:p>
                       <a:r>
                         <a:rPr lang="en-US" altLang="zh-CN" dirty="0" err="1" smtClean="0"/>
-                        <a:t>MediaWiki</a:t>
-                      </a:r>
-                      <a:r>
-                        <a:rPr lang="en-US" altLang="zh-CN" dirty="0" smtClean="0"/>
-                        <a:t>(w)</a:t>
+                        <a:t>Phabricator</a:t>
                       </a:r>
                       <a:endParaRPr lang="zh-CN" altLang="en-US" dirty="0"/>
                     </a:p>
@@ -3990,11 +3980,7 @@
                     <a:p>
                       <a:r>
                         <a:rPr lang="en-US" altLang="zh-CN" dirty="0" err="1" smtClean="0"/>
-                        <a:t>go.toyhouse.cc</a:t>
-                      </a:r>
-                      <a:r>
-                        <a:rPr lang="en-US" altLang="zh-CN" dirty="0" smtClean="0"/>
-                        <a:t>(c)</a:t>
+                        <a:t>MediaWiki</a:t>
                       </a:r>
                       <a:endParaRPr lang="zh-CN" altLang="en-US" dirty="0"/>
                     </a:p>
@@ -4008,11 +3994,7 @@
                     <a:p>
                       <a:r>
                         <a:rPr lang="en-US" altLang="zh-CN" dirty="0" err="1" smtClean="0"/>
-                        <a:t>Mediagoblin</a:t>
-                      </a:r>
-                      <a:r>
-                        <a:rPr lang="en-US" altLang="zh-CN" dirty="0" smtClean="0"/>
-                        <a:t>(m)</a:t>
+                        <a:t>Piwik</a:t>
                       </a:r>
                       <a:endParaRPr lang="zh-CN" altLang="en-US" dirty="0"/>
                     </a:p>
@@ -4020,51 +4002,7 @@
                   <a:tcPr/>
                 </a:tc>
               </a:tr>
-              <a:tr h="311604">
-                <a:tc>
-                  <a:txBody>
-                    <a:bodyPr/>
-                    <a:lstStyle/>
-                    <a:p>
-                      <a:r>
-                        <a:rPr lang="en-US" altLang="zh-CN" dirty="0" err="1" smtClean="0"/>
-                        <a:t>Docker</a:t>
-                      </a:r>
-                      <a:endParaRPr lang="zh-CN" altLang="en-US" dirty="0"/>
-                    </a:p>
-                  </a:txBody>
-                  <a:tcPr/>
-                </a:tc>
-                <a:tc>
-                  <a:txBody>
-                    <a:bodyPr/>
-                    <a:lstStyle/>
-                    <a:p>
-                      <a:r>
-                        <a:rPr lang="en-US" altLang="zh-CN" dirty="0" err="1" smtClean="0"/>
-                        <a:t>Git</a:t>
-                      </a:r>
-                      <a:endParaRPr lang="zh-CN" altLang="en-US" dirty="0"/>
-                    </a:p>
-                  </a:txBody>
-                  <a:tcPr/>
-                </a:tc>
-                <a:tc>
-                  <a:txBody>
-                    <a:bodyPr/>
-                    <a:lstStyle/>
-                    <a:p>
-                      <a:r>
-                        <a:rPr lang="en-US" altLang="zh-CN" dirty="0" err="1" smtClean="0"/>
-                        <a:t>OpenModelica</a:t>
-                      </a:r>
-                      <a:endParaRPr lang="zh-CN" altLang="en-US" dirty="0"/>
-                    </a:p>
-                  </a:txBody>
-                  <a:tcPr/>
-                </a:tc>
-              </a:tr>
-              <a:tr h="537837">
+              <a:tr h="347977">
                 <a:tc>
                   <a:txBody>
                     <a:bodyPr/>
@@ -4086,11 +4024,38 @@
                     <a:p>
                       <a:r>
                         <a:rPr lang="en-US" altLang="zh-CN" dirty="0" err="1" smtClean="0"/>
-                        <a:t>Juypter</a:t>
+                        <a:t>Netlogo</a:t>
                       </a:r>
-                      <a:endParaRPr lang="en-US" altLang="zh-CN" dirty="0" smtClean="0"/>
+                      <a:endParaRPr lang="zh-CN" altLang="en-US" dirty="0"/>
                     </a:p>
+                  </a:txBody>
+                  <a:tcPr/>
+                </a:tc>
+                <a:tc>
+                  <a:txBody>
+                    <a:bodyPr/>
+                    <a:lstStyle/>
                     <a:p>
+                      <a:r>
+                        <a:rPr lang="en-US" altLang="zh-CN" dirty="0" err="1" smtClean="0"/>
+                        <a:t>JuyperHub</a:t>
+                      </a:r>
+                      <a:endParaRPr lang="zh-CN" altLang="en-US" dirty="0"/>
+                    </a:p>
+                  </a:txBody>
+                  <a:tcPr/>
+                </a:tc>
+              </a:tr>
+              <a:tr h="511687">
+                <a:tc>
+                  <a:txBody>
+                    <a:bodyPr/>
+                    <a:lstStyle/>
+                    <a:p>
+                      <a:r>
+                        <a:rPr lang="en-US" altLang="zh-CN" dirty="0" smtClean="0"/>
+                        <a:t>Jenkins</a:t>
+                      </a:r>
                       <a:endParaRPr lang="zh-CN" altLang="en-US" dirty="0"/>
                     </a:p>
                   </a:txBody>
@@ -4103,14 +4068,112 @@
                     <a:p>
                       <a:r>
                         <a:rPr lang="en-US" altLang="zh-CN" dirty="0" smtClean="0"/>
-                        <a:t>Jenkins</a:t>
-                      </a:r>
-                      <a:r>
-                        <a:rPr lang="mr-IN" altLang="zh-CN" dirty="0" smtClean="0"/>
-                        <a:t>…</a:t>
+                        <a:t>Nexus</a:t>
                       </a:r>
                       <a:endParaRPr lang="en-US" altLang="zh-CN" dirty="0" smtClean="0"/>
                     </a:p>
+                  </a:txBody>
+                  <a:tcPr/>
+                </a:tc>
+                <a:tc>
+                  <a:txBody>
+                    <a:bodyPr/>
+                    <a:lstStyle/>
+                    <a:p>
+                      <a:r>
+                        <a:rPr lang="en-US" altLang="zh-CN" dirty="0" err="1" smtClean="0"/>
+                        <a:t>Gitlab</a:t>
+                      </a:r>
+                      <a:endParaRPr lang="en-US" altLang="zh-CN" dirty="0" smtClean="0"/>
+                    </a:p>
+                  </a:txBody>
+                  <a:tcPr/>
+                </a:tc>
+              </a:tr>
+              <a:tr h="511687">
+                <a:tc>
+                  <a:txBody>
+                    <a:bodyPr/>
+                    <a:lstStyle/>
+                    <a:p>
+                      <a:endParaRPr lang="zh-CN" altLang="en-US" dirty="0"/>
+                    </a:p>
+                  </a:txBody>
+                  <a:tcPr/>
+                </a:tc>
+                <a:tc>
+                  <a:txBody>
+                    <a:bodyPr/>
+                    <a:lstStyle/>
+                    <a:p>
+                      <a:pPr marL="0" marR="0" indent="0" algn="ctr" defTabSz="457200" rtl="0" eaLnBrk="1" fontAlgn="auto" latinLnBrk="0" hangingPunct="1">
+                        <a:lnSpc>
+                          <a:spcPct val="100000"/>
+                        </a:lnSpc>
+                        <a:spcBef>
+                          <a:spcPts val="0"/>
+                        </a:spcBef>
+                        <a:spcAft>
+                          <a:spcPts val="0"/>
+                        </a:spcAft>
+                        <a:buClrTx/>
+                        <a:buSzTx/>
+                        <a:buFontTx/>
+                        <a:buNone/>
+                        <a:tabLst/>
+                        <a:defRPr/>
+                      </a:pPr>
+                      <a:r>
+                        <a:rPr lang="en-US" altLang="zh-CN" dirty="0" err="1" smtClean="0"/>
+                        <a:t>Kubernetes</a:t>
+                      </a:r>
+                      <a:endParaRPr lang="en-US" altLang="zh-CN" dirty="0" smtClean="0"/>
+                    </a:p>
+                  </a:txBody>
+                  <a:tcPr/>
+                </a:tc>
+                <a:tc>
+                  <a:txBody>
+                    <a:bodyPr/>
+                    <a:lstStyle/>
+                    <a:p>
+                      <a:endParaRPr lang="zh-CN" altLang="en-US" dirty="0"/>
+                    </a:p>
+                  </a:txBody>
+                  <a:tcPr/>
+                </a:tc>
+              </a:tr>
+              <a:tr h="153646">
+                <a:tc>
+                  <a:txBody>
+                    <a:bodyPr/>
+                    <a:lstStyle/>
+                    <a:p>
+                      <a:pPr algn="ctr"/>
+                      <a:endParaRPr lang="zh-CN" altLang="en-US" dirty="0"/>
+                    </a:p>
+                  </a:txBody>
+                  <a:tcPr/>
+                </a:tc>
+                <a:tc>
+                  <a:txBody>
+                    <a:bodyPr/>
+                    <a:lstStyle/>
+                    <a:p>
+                      <a:pPr algn="ctr"/>
+                      <a:r>
+                        <a:rPr lang="en-US" altLang="zh-CN" dirty="0" smtClean="0"/>
+                        <a:t>DC/OS</a:t>
+                      </a:r>
+                      <a:endParaRPr lang="zh-CN" altLang="en-US" dirty="0" smtClean="0"/>
+                    </a:p>
+                  </a:txBody>
+                  <a:tcPr/>
+                </a:tc>
+                <a:tc>
+                  <a:txBody>
+                    <a:bodyPr/>
+                    <a:lstStyle/>
                     <a:p>
                       <a:endParaRPr lang="zh-CN" altLang="en-US" dirty="0"/>
                     </a:p>
@@ -4130,7 +4193,7 @@
         </p:nvSpPr>
         <p:spPr>
           <a:xfrm>
-            <a:off x="4287691" y="2899758"/>
+            <a:off x="4287691" y="2189994"/>
             <a:ext cx="1386565" cy="369332"/>
           </a:xfrm>
           <a:prstGeom prst="rect">
@@ -4160,7 +4223,7 @@
         </p:nvSpPr>
         <p:spPr>
           <a:xfrm>
-            <a:off x="2944312" y="2658079"/>
+            <a:off x="2944312" y="1948315"/>
             <a:ext cx="1386565" cy="369332"/>
           </a:xfrm>
           <a:prstGeom prst="rect">
@@ -4190,7 +4253,7 @@
         </p:nvCxnSpPr>
         <p:spPr>
           <a:xfrm>
-            <a:off x="3871354" y="3269090"/>
+            <a:off x="3871354" y="2559326"/>
             <a:ext cx="459523" cy="217501"/>
           </a:xfrm>
           <a:prstGeom prst="line">
@@ -4225,9 +4288,9 @@
           <p:nvPr/>
         </p:nvCxnSpPr>
         <p:spPr>
-          <a:xfrm flipV="1">
-            <a:off x="3871354" y="3825350"/>
-            <a:ext cx="482475" cy="27561"/>
+          <a:xfrm>
+            <a:off x="3871354" y="3008527"/>
+            <a:ext cx="482475" cy="107059"/>
           </a:xfrm>
           <a:prstGeom prst="line">
             <a:avLst/>
@@ -4259,7 +4322,7 @@
         </p:nvCxnSpPr>
         <p:spPr>
           <a:xfrm flipV="1">
-            <a:off x="3871354" y="4233718"/>
+            <a:off x="3871354" y="3523954"/>
             <a:ext cx="459523" cy="147892"/>
           </a:xfrm>
           <a:prstGeom prst="line">

</xml_diff>